<commit_message>
Minor change to presentation
</commit_message>
<xml_diff>
--- a/Presentations/Presentation_12.10.2016/Initial_pitch.pptx
+++ b/Presentations/Presentation_12.10.2016/Initial_pitch.pptx
@@ -261,7 +261,7 @@
           <a:p>
             <a:fld id="{A1F92DD0-D123-4740-A99F-A0FEE96B0ED7}" type="datetimeFigureOut">
               <a:rPr lang="en-GB" smtClean="0"/>
-              <a:t>11/10/2016</a:t>
+              <a:t>11/11/2016</a:t>
             </a:fld>
             <a:endParaRPr lang="en-GB"/>
           </a:p>
@@ -431,7 +431,7 @@
           <a:p>
             <a:fld id="{A1F92DD0-D123-4740-A99F-A0FEE96B0ED7}" type="datetimeFigureOut">
               <a:rPr lang="en-GB" smtClean="0"/>
-              <a:t>11/10/2016</a:t>
+              <a:t>11/11/2016</a:t>
             </a:fld>
             <a:endParaRPr lang="en-GB"/>
           </a:p>
@@ -611,7 +611,7 @@
           <a:p>
             <a:fld id="{A1F92DD0-D123-4740-A99F-A0FEE96B0ED7}" type="datetimeFigureOut">
               <a:rPr lang="en-GB" smtClean="0"/>
-              <a:t>11/10/2016</a:t>
+              <a:t>11/11/2016</a:t>
             </a:fld>
             <a:endParaRPr lang="en-GB"/>
           </a:p>
@@ -781,7 +781,7 @@
           <a:p>
             <a:fld id="{A1F92DD0-D123-4740-A99F-A0FEE96B0ED7}" type="datetimeFigureOut">
               <a:rPr lang="en-GB" smtClean="0"/>
-              <a:t>11/10/2016</a:t>
+              <a:t>11/11/2016</a:t>
             </a:fld>
             <a:endParaRPr lang="en-GB"/>
           </a:p>
@@ -1027,7 +1027,7 @@
           <a:p>
             <a:fld id="{A1F92DD0-D123-4740-A99F-A0FEE96B0ED7}" type="datetimeFigureOut">
               <a:rPr lang="en-GB" smtClean="0"/>
-              <a:t>11/10/2016</a:t>
+              <a:t>11/11/2016</a:t>
             </a:fld>
             <a:endParaRPr lang="en-GB"/>
           </a:p>
@@ -1259,7 +1259,7 @@
           <a:p>
             <a:fld id="{A1F92DD0-D123-4740-A99F-A0FEE96B0ED7}" type="datetimeFigureOut">
               <a:rPr lang="en-GB" smtClean="0"/>
-              <a:t>11/10/2016</a:t>
+              <a:t>11/11/2016</a:t>
             </a:fld>
             <a:endParaRPr lang="en-GB"/>
           </a:p>
@@ -1626,7 +1626,7 @@
           <a:p>
             <a:fld id="{A1F92DD0-D123-4740-A99F-A0FEE96B0ED7}" type="datetimeFigureOut">
               <a:rPr lang="en-GB" smtClean="0"/>
-              <a:t>11/10/2016</a:t>
+              <a:t>11/11/2016</a:t>
             </a:fld>
             <a:endParaRPr lang="en-GB"/>
           </a:p>
@@ -1744,7 +1744,7 @@
           <a:p>
             <a:fld id="{A1F92DD0-D123-4740-A99F-A0FEE96B0ED7}" type="datetimeFigureOut">
               <a:rPr lang="en-GB" smtClean="0"/>
-              <a:t>11/10/2016</a:t>
+              <a:t>11/11/2016</a:t>
             </a:fld>
             <a:endParaRPr lang="en-GB"/>
           </a:p>
@@ -1839,7 +1839,7 @@
           <a:p>
             <a:fld id="{A1F92DD0-D123-4740-A99F-A0FEE96B0ED7}" type="datetimeFigureOut">
               <a:rPr lang="en-GB" smtClean="0"/>
-              <a:t>11/10/2016</a:t>
+              <a:t>11/11/2016</a:t>
             </a:fld>
             <a:endParaRPr lang="en-GB"/>
           </a:p>
@@ -2116,7 +2116,7 @@
           <a:p>
             <a:fld id="{A1F92DD0-D123-4740-A99F-A0FEE96B0ED7}" type="datetimeFigureOut">
               <a:rPr lang="en-GB" smtClean="0"/>
-              <a:t>11/10/2016</a:t>
+              <a:t>11/11/2016</a:t>
             </a:fld>
             <a:endParaRPr lang="en-GB"/>
           </a:p>
@@ -2369,7 +2369,7 @@
           <a:p>
             <a:fld id="{A1F92DD0-D123-4740-A99F-A0FEE96B0ED7}" type="datetimeFigureOut">
               <a:rPr lang="en-GB" smtClean="0"/>
-              <a:t>11/10/2016</a:t>
+              <a:t>11/11/2016</a:t>
             </a:fld>
             <a:endParaRPr lang="en-GB"/>
           </a:p>
@@ -2582,7 +2582,7 @@
           <a:p>
             <a:fld id="{A1F92DD0-D123-4740-A99F-A0FEE96B0ED7}" type="datetimeFigureOut">
               <a:rPr lang="en-GB" smtClean="0"/>
-              <a:t>11/10/2016</a:t>
+              <a:t>11/11/2016</a:t>
             </a:fld>
             <a:endParaRPr lang="en-GB"/>
           </a:p>
@@ -2999,8 +2999,8 @@
         </p:nvSpPr>
         <p:spPr>
           <a:xfrm>
-            <a:off x="1429556" y="283335"/>
-            <a:ext cx="9191222" cy="2634199"/>
+            <a:off x="1429556" y="0"/>
+            <a:ext cx="9191222" cy="3838722"/>
           </a:xfrm>
         </p:spPr>
         <p:txBody>
@@ -3015,7 +3015,7 @@
                 <a:ea typeface="Roboto Light" panose="02000000000000000000" pitchFamily="2" charset="0"/>
                 <a:cs typeface="Roboto Light" panose="02000000000000000000" pitchFamily="2" charset="0"/>
               </a:rPr>
-              <a:t>Group 3</a:t>
+              <a:t/>
             </a:r>
             <a:br>
               <a:rPr lang="en-GB" sz="8000" dirty="0" smtClean="0">
@@ -3025,14 +3025,60 @@
               </a:rPr>
             </a:br>
             <a:r>
+              <a:rPr lang="en-GB" sz="8000" b="1" dirty="0" smtClean="0">
+                <a:latin typeface="Roboto Light" panose="02000000000000000000" pitchFamily="2" charset="0"/>
+                <a:ea typeface="Roboto Light" panose="02000000000000000000" pitchFamily="2" charset="0"/>
+                <a:cs typeface="Roboto Light" panose="02000000000000000000" pitchFamily="2" charset="0"/>
+              </a:rPr>
+              <a:t>Group Project</a:t>
+            </a:r>
+            <a:r>
+              <a:rPr lang="en-GB" sz="8000" dirty="0">
+                <a:latin typeface="Roboto Light" panose="02000000000000000000" pitchFamily="2" charset="0"/>
+                <a:ea typeface="Roboto Light" panose="02000000000000000000" pitchFamily="2" charset="0"/>
+                <a:cs typeface="Roboto Light" panose="02000000000000000000" pitchFamily="2" charset="0"/>
+              </a:rPr>
+              <a:t/>
+            </a:r>
+            <a:br>
+              <a:rPr lang="en-GB" sz="8000" dirty="0">
+                <a:latin typeface="Roboto Light" panose="02000000000000000000" pitchFamily="2" charset="0"/>
+                <a:ea typeface="Roboto Light" panose="02000000000000000000" pitchFamily="2" charset="0"/>
+                <a:cs typeface="Roboto Light" panose="02000000000000000000" pitchFamily="2" charset="0"/>
+              </a:rPr>
+            </a:br>
+            <a:r>
               <a:rPr lang="en-GB" sz="8000" dirty="0" smtClean="0">
                 <a:latin typeface="Roboto Light" panose="02000000000000000000" pitchFamily="2" charset="0"/>
                 <a:ea typeface="Roboto Light" panose="02000000000000000000" pitchFamily="2" charset="0"/>
                 <a:cs typeface="Roboto Light" panose="02000000000000000000" pitchFamily="2" charset="0"/>
               </a:rPr>
+              <a:t>Level 6 Group </a:t>
+            </a:r>
+            <a:r>
+              <a:rPr lang="en-GB" sz="8000" dirty="0" smtClean="0">
+                <a:latin typeface="Roboto Light" panose="02000000000000000000" pitchFamily="2" charset="0"/>
+                <a:ea typeface="Roboto Light" panose="02000000000000000000" pitchFamily="2" charset="0"/>
+                <a:cs typeface="Roboto Light" panose="02000000000000000000" pitchFamily="2" charset="0"/>
+              </a:rPr>
+              <a:t>3</a:t>
+            </a:r>
+            <a:br>
+              <a:rPr lang="en-GB" sz="8000" dirty="0" smtClean="0">
+                <a:latin typeface="Roboto Light" panose="02000000000000000000" pitchFamily="2" charset="0"/>
+                <a:ea typeface="Roboto Light" panose="02000000000000000000" pitchFamily="2" charset="0"/>
+                <a:cs typeface="Roboto Light" panose="02000000000000000000" pitchFamily="2" charset="0"/>
+              </a:rPr>
+            </a:br>
+            <a:r>
+              <a:rPr lang="en-GB" sz="4800" dirty="0" smtClean="0">
+                <a:latin typeface="Roboto Light" panose="02000000000000000000" pitchFamily="2" charset="0"/>
+                <a:ea typeface="Roboto Light" panose="02000000000000000000" pitchFamily="2" charset="0"/>
+                <a:cs typeface="Roboto Light" panose="02000000000000000000" pitchFamily="2" charset="0"/>
+              </a:rPr>
               <a:t>Initial Pitch</a:t>
             </a:r>
-            <a:endParaRPr lang="en-GB" sz="8000" dirty="0">
+            <a:endParaRPr lang="en-GB" sz="4800" dirty="0">
               <a:latin typeface="Roboto Light" panose="02000000000000000000" pitchFamily="2" charset="0"/>
               <a:ea typeface="Roboto Light" panose="02000000000000000000" pitchFamily="2" charset="0"/>
               <a:cs typeface="Roboto Light" panose="02000000000000000000" pitchFamily="2" charset="0"/>
@@ -3052,7 +3098,7 @@
         </p:nvSpPr>
         <p:spPr>
           <a:xfrm>
-            <a:off x="1476777" y="3716025"/>
+            <a:off x="1453167" y="4964254"/>
             <a:ext cx="9144000" cy="1655762"/>
           </a:xfrm>
         </p:spPr>

</xml_diff>